<commit_message>
Updates based off of Kents feedback
</commit_message>
<xml_diff>
--- a/assets/tactile_image_files/0016-types_of_unconformities/0016-types_of_unconformities.pptx
+++ b/assets/tactile_image_files/0016-types_of_unconformities/0016-types_of_unconformities.pptx
@@ -198,7 +198,7 @@
           </a:lstStyle>
           <a:p>
             <a:fld id="{DC880F74-5F87-E94E-8AEF-72C270124CC0}" type="datetimeFigureOut">
-              <a:t>7/23/20</a:t>
+              <a:t>12/18/20</a:t>
             </a:fld>
             <a:endParaRPr lang="en-US"/>
           </a:p>
@@ -603,7 +603,7 @@
           <a:p>
             <a:fld id="{E796F801-3BB8-A247-923B-F07F1B58D38A}" type="datetimeFigureOut">
               <a:rPr lang="en-US" smtClean="0"/>
-              <a:t>7/23/20</a:t>
+              <a:t>12/18/20</a:t>
             </a:fld>
             <a:endParaRPr lang="en-US"/>
           </a:p>
@@ -783,7 +783,7 @@
           <a:p>
             <a:fld id="{E796F801-3BB8-A247-923B-F07F1B58D38A}" type="datetimeFigureOut">
               <a:rPr lang="en-US" smtClean="0"/>
-              <a:t>7/23/20</a:t>
+              <a:t>12/18/20</a:t>
             </a:fld>
             <a:endParaRPr lang="en-US"/>
           </a:p>
@@ -953,7 +953,7 @@
           <a:p>
             <a:fld id="{E796F801-3BB8-A247-923B-F07F1B58D38A}" type="datetimeFigureOut">
               <a:rPr lang="en-US" smtClean="0"/>
-              <a:t>7/23/20</a:t>
+              <a:t>12/18/20</a:t>
             </a:fld>
             <a:endParaRPr lang="en-US"/>
           </a:p>
@@ -1197,7 +1197,7 @@
           <a:p>
             <a:fld id="{E796F801-3BB8-A247-923B-F07F1B58D38A}" type="datetimeFigureOut">
               <a:rPr lang="en-US" smtClean="0"/>
-              <a:t>7/23/20</a:t>
+              <a:t>12/18/20</a:t>
             </a:fld>
             <a:endParaRPr lang="en-US"/>
           </a:p>
@@ -1429,7 +1429,7 @@
           <a:p>
             <a:fld id="{E796F801-3BB8-A247-923B-F07F1B58D38A}" type="datetimeFigureOut">
               <a:rPr lang="en-US" smtClean="0"/>
-              <a:t>7/23/20</a:t>
+              <a:t>12/18/20</a:t>
             </a:fld>
             <a:endParaRPr lang="en-US"/>
           </a:p>
@@ -1796,7 +1796,7 @@
           <a:p>
             <a:fld id="{E796F801-3BB8-A247-923B-F07F1B58D38A}" type="datetimeFigureOut">
               <a:rPr lang="en-US" smtClean="0"/>
-              <a:t>7/23/20</a:t>
+              <a:t>12/18/20</a:t>
             </a:fld>
             <a:endParaRPr lang="en-US"/>
           </a:p>
@@ -1914,7 +1914,7 @@
           <a:p>
             <a:fld id="{E796F801-3BB8-A247-923B-F07F1B58D38A}" type="datetimeFigureOut">
               <a:rPr lang="en-US" smtClean="0"/>
-              <a:t>7/23/20</a:t>
+              <a:t>12/18/20</a:t>
             </a:fld>
             <a:endParaRPr lang="en-US"/>
           </a:p>
@@ -2009,7 +2009,7 @@
           <a:p>
             <a:fld id="{E796F801-3BB8-A247-923B-F07F1B58D38A}" type="datetimeFigureOut">
               <a:rPr lang="en-US" smtClean="0"/>
-              <a:t>7/23/20</a:t>
+              <a:t>12/18/20</a:t>
             </a:fld>
             <a:endParaRPr lang="en-US"/>
           </a:p>
@@ -2286,7 +2286,7 @@
           <a:p>
             <a:fld id="{E796F801-3BB8-A247-923B-F07F1B58D38A}" type="datetimeFigureOut">
               <a:rPr lang="en-US" smtClean="0"/>
-              <a:t>7/23/20</a:t>
+              <a:t>12/18/20</a:t>
             </a:fld>
             <a:endParaRPr lang="en-US"/>
           </a:p>
@@ -2543,7 +2543,7 @@
           <a:p>
             <a:fld id="{E796F801-3BB8-A247-923B-F07F1B58D38A}" type="datetimeFigureOut">
               <a:rPr lang="en-US" smtClean="0"/>
-              <a:t>7/23/20</a:t>
+              <a:t>12/18/20</a:t>
             </a:fld>
             <a:endParaRPr lang="en-US"/>
           </a:p>
@@ -2756,7 +2756,7 @@
           <a:p>
             <a:fld id="{E796F801-3BB8-A247-923B-F07F1B58D38A}" type="datetimeFigureOut">
               <a:rPr lang="en-US" smtClean="0"/>
-              <a:t>7/23/20</a:t>
+              <a:t>12/18/20</a:t>
             </a:fld>
             <a:endParaRPr lang="en-US"/>
           </a:p>
@@ -12570,7 +12570,7 @@
         </p:nvSpPr>
         <p:spPr>
           <a:xfrm>
-            <a:off x="212661" y="5657671"/>
+            <a:off x="255192" y="5742732"/>
             <a:ext cx="4444410" cy="830997"/>
           </a:xfrm>
           <a:prstGeom prst="rect">
@@ -17184,6 +17184,58 @@
           </a:fontRef>
         </p:style>
       </p:cxnSp>
+      <p:sp>
+        <p:nvSpPr>
+          <p:cNvPr id="2" name="Rectangle 1">
+            <a:extLst>
+              <a:ext uri="{FF2B5EF4-FFF2-40B4-BE49-F238E27FC236}">
+                <a16:creationId xmlns:a16="http://schemas.microsoft.com/office/drawing/2014/main" id="{DB48413E-B6EE-8246-B4D8-21126FAF8FC9}"/>
+              </a:ext>
+            </a:extLst>
+          </p:cNvPr>
+          <p:cNvSpPr/>
+          <p:nvPr/>
+        </p:nvSpPr>
+        <p:spPr>
+          <a:xfrm>
+            <a:off x="2254102" y="6188149"/>
+            <a:ext cx="1765005" cy="489098"/>
+          </a:xfrm>
+          <a:prstGeom prst="rect">
+            <a:avLst/>
+          </a:prstGeom>
+          <a:solidFill>
+            <a:schemeClr val="bg1"/>
+          </a:solidFill>
+          <a:ln>
+            <a:noFill/>
+          </a:ln>
+        </p:spPr>
+        <p:style>
+          <a:lnRef idx="2">
+            <a:schemeClr val="accent1">
+              <a:shade val="50000"/>
+            </a:schemeClr>
+          </a:lnRef>
+          <a:fillRef idx="1">
+            <a:schemeClr val="accent1"/>
+          </a:fillRef>
+          <a:effectRef idx="0">
+            <a:schemeClr val="accent1"/>
+          </a:effectRef>
+          <a:fontRef idx="minor">
+            <a:schemeClr val="lt1"/>
+          </a:fontRef>
+        </p:style>
+        <p:txBody>
+          <a:bodyPr rtlCol="0" anchor="ctr"/>
+          <a:lstStyle/>
+          <a:p>
+            <a:pPr algn="ctr"/>
+            <a:endParaRPr lang="en-US"/>
+          </a:p>
+        </p:txBody>
+      </p:sp>
     </p:spTree>
     <p:extLst>
       <p:ext uri="{BB962C8B-B14F-4D97-AF65-F5344CB8AC3E}">

</xml_diff>